<commit_message>
Updated index.html to fix CORS-related functionality
</commit_message>
<xml_diff>
--- a/output/generated_presentation.pptx
+++ b/output/generated_presentation.pptx
@@ -12625,7 +12625,7 @@
           <a:lstStyle/>
           <a:p>
             <a:r>
-              <a:t>The Impact of Artificial Intelligence on Modern Healthcare</a:t>
+              <a:t>Understanding Sample Data</a:t>
             </a:r>
           </a:p>
         </p:txBody>
@@ -12646,7 +12646,7 @@
           <a:lstStyle/>
           <a:p>
             <a:r>
-              <a:t>Transforming Patient Care and Medical Practices</a:t>
+              <a:t>A Comprehensive Guide to Analyzing and Interpreting Data</a:t>
             </a:r>
           </a:p>
         </p:txBody>
@@ -12723,7 +12723,7 @@
           <a:lstStyle/>
           <a:p>
             <a:r>
-              <a:t>AI in Diagnostics</a:t>
+              <a:t>Definition and Types</a:t>
             </a:r>
           </a:p>
         </p:txBody>
@@ -12744,7 +12744,7 @@
           <a:lstStyle/>
           <a:p>
             <a:r>
-              <a:t>AI in Treatment Planning</a:t>
+              <a:t>Importance</a:t>
             </a:r>
           </a:p>
         </p:txBody>
@@ -12765,7 +12765,7 @@
           <a:lstStyle/>
           <a:p>
             <a:r>
-              <a:t>Overview of AI's role in healthcare</a:t>
+              <a:t>Overview of sample data's role in research.</a:t>
             </a:r>
           </a:p>
         </p:txBody>
@@ -12786,7 +12786,7 @@
           <a:lstStyle/>
           <a:p>
             <a:r>
-              <a:t>Enhancing disease detection and analysis</a:t>
+              <a:t>Different types of sample data and their significance.</a:t>
             </a:r>
           </a:p>
         </p:txBody>
@@ -12807,7 +12807,7 @@
           <a:lstStyle/>
           <a:p>
             <a:r>
-              <a:t>Optimizing personalized medicine</a:t>
+              <a:t>Why sample data is essential for research.</a:t>
             </a:r>
           </a:p>
         </p:txBody>
@@ -12828,7 +12828,7 @@
           <a:lstStyle/>
           <a:p>
             <a:r>
-              <a:t>Recap of AI's impact on healthcare</a:t>
+              <a:t>Recap of key points discussed.</a:t>
             </a:r>
           </a:p>
         </p:txBody>
@@ -12849,7 +12849,7 @@
           <a:lstStyle/>
           <a:p>
             <a:r>
-              <a:t>Improving patient care and support</a:t>
+              <a:t>Techniques for analyzing sample data.</a:t>
             </a:r>
           </a:p>
         </p:txBody>
@@ -12891,7 +12891,7 @@
           <a:lstStyle/>
           <a:p>
             <a:r>
-              <a:t>AI in Patient Management</a:t>
+              <a:t>Methods</a:t>
             </a:r>
           </a:p>
         </p:txBody>
@@ -12947,7 +12947,7 @@
           <a:lstStyle/>
           <a:p>
             <a:r>
-              <a:t>Artificial Intelligence is revolutionizing healthcare by enhancing diagnostic accuracy, optimizing treatment plans, and improving patient management.</a:t>
+              <a:t>Sample data is crucial for making informed decisions in research and business by providing insights into larger populations.</a:t>
             </a:r>
           </a:p>
         </p:txBody>
@@ -12986,7 +12986,7 @@
           <a:lstStyle/>
           <a:p>
             <a:r>
-              <a:t>High Precision</a:t>
+              <a:t>Sample Data</a:t>
             </a:r>
           </a:p>
         </p:txBody>
@@ -13007,7 +13007,7 @@
           <a:lstStyle/>
           <a:p>
             <a:r>
-              <a:t>AI algorithms analyze medical images for early disease detection.</a:t>
+              <a:t>A subset of data collected from a larger population.</a:t>
             </a:r>
           </a:p>
         </p:txBody>
@@ -13028,7 +13028,7 @@
           <a:lstStyle/>
           <a:p>
             <a:r>
-              <a:t>Machine learning predicts disease outbreaks from data patterns.</a:t>
+              <a:t>Includes random, stratified, and systematic samples.</a:t>
             </a:r>
           </a:p>
         </p:txBody>
@@ -13049,7 +13049,7 @@
           <a:lstStyle/>
           <a:p>
             <a:r>
-              <a:t>AI tools assist in identifying areas of concern in scans.</a:t>
+              <a:t>Ensures equal chance of selection for all members.</a:t>
             </a:r>
           </a:p>
         </p:txBody>
@@ -13070,7 +13070,7 @@
           <a:lstStyle/>
           <a:p>
             <a:r>
-              <a:t>AI reduces human error in diagnostic processes.</a:t>
+              <a:t>Divides population into subgroups for sampling.</a:t>
             </a:r>
           </a:p>
         </p:txBody>
@@ -13091,7 +13091,7 @@
           <a:lstStyle/>
           <a:p>
             <a:r>
-              <a:t>AI in Diagnostics</a:t>
+              <a:t>Definition and Types of Sample Data</a:t>
             </a:r>
           </a:p>
         </p:txBody>
@@ -13112,7 +13112,7 @@
           <a:lstStyle/>
           <a:p>
             <a:r>
-              <a:t>Transforming disease detection</a:t>
+              <a:t>Understanding sample data</a:t>
             </a:r>
           </a:p>
         </p:txBody>
@@ -13133,7 +13133,7 @@
           <a:lstStyle/>
           <a:p>
             <a:r>
-              <a:t>Predictive Analytics</a:t>
+              <a:t>Types</a:t>
             </a:r>
           </a:p>
         </p:txBody>
@@ -13154,7 +13154,7 @@
           <a:lstStyle/>
           <a:p>
             <a:r>
-              <a:t>Radiologist Support</a:t>
+              <a:t>Random Samples</a:t>
             </a:r>
           </a:p>
         </p:txBody>
@@ -13175,7 +13175,7 @@
           <a:lstStyle/>
           <a:p>
             <a:r>
-              <a:t>Error Reduction</a:t>
+              <a:t>Stratified Samples</a:t>
             </a:r>
           </a:p>
         </p:txBody>
@@ -13214,7 +13214,7 @@
           <a:lstStyle/>
           <a:p>
             <a:r>
-              <a:t>Tailored Treatments</a:t>
+              <a:t>Inferences</a:t>
             </a:r>
           </a:p>
         </p:txBody>
@@ -13235,7 +13235,7 @@
           <a:lstStyle/>
           <a:p>
             <a:r>
-              <a:t>AI customizes treatment plans based on genetic data.</a:t>
+              <a:t>Allows researchers to infer about a population.</a:t>
             </a:r>
           </a:p>
         </p:txBody>
@@ -13256,7 +13256,7 @@
           <a:lstStyle/>
           <a:p>
             <a:r>
-              <a:t>AI predicts patient responses to various therapies.</a:t>
+              <a:t>More efficient than studying an entire population.</a:t>
             </a:r>
           </a:p>
         </p:txBody>
@@ -13277,7 +13277,7 @@
           <a:lstStyle/>
           <a:p>
             <a:r>
-              <a:t>AI provides evidence-based recommendations for clinicians.</a:t>
+              <a:t>Validates research models effectively.</a:t>
             </a:r>
           </a:p>
         </p:txBody>
@@ -13298,7 +13298,7 @@
           <a:lstStyle/>
           <a:p>
             <a:r>
-              <a:t>AI leads to more effective treatment strategies.</a:t>
+              <a:t>Saves time in data collection and analysis.</a:t>
             </a:r>
           </a:p>
         </p:txBody>
@@ -13319,7 +13319,7 @@
           <a:lstStyle/>
           <a:p>
             <a:r>
-              <a:t>AI in Treatment Planning</a:t>
+              <a:t>Importance of Sample Data in Research</a:t>
             </a:r>
           </a:p>
         </p:txBody>
@@ -13340,7 +13340,7 @@
           <a:lstStyle/>
           <a:p>
             <a:r>
-              <a:t>Enhancing personalized medicine</a:t>
+              <a:t>Significance in research</a:t>
             </a:r>
           </a:p>
         </p:txBody>
@@ -13361,7 +13361,7 @@
           <a:lstStyle/>
           <a:p>
             <a:r>
-              <a:t>Drug Interaction Simulation</a:t>
+              <a:t>Cost-effective</a:t>
             </a:r>
           </a:p>
         </p:txBody>
@@ -13382,7 +13382,7 @@
           <a:lstStyle/>
           <a:p>
             <a:r>
-              <a:t>Decision Support</a:t>
+              <a:t>Hypothesis Testing</a:t>
             </a:r>
           </a:p>
         </p:txBody>
@@ -13403,7 +13403,7 @@
           <a:lstStyle/>
           <a:p>
             <a:r>
-              <a:t>Improved Outcomes</a:t>
+              <a:t>Time-efficient</a:t>
             </a:r>
           </a:p>
         </p:txBody>
@@ -13442,7 +13442,7 @@
           <a:lstStyle/>
           <a:p>
             <a:r>
-              <a:t>24/7 Support</a:t>
+              <a:t>Descriptive Statistics</a:t>
             </a:r>
           </a:p>
         </p:txBody>
@@ -13463,7 +13463,7 @@
           <a:lstStyle/>
           <a:p>
             <a:r>
-              <a:t>AI chatbots provide constant patient assistance.</a:t>
+              <a:t>Summarizes main features of a data set.</a:t>
             </a:r>
           </a:p>
         </p:txBody>
@@ -13484,7 +13484,7 @@
           <a:lstStyle/>
           <a:p>
             <a:r>
-              <a:t>Predictive analytics forecast health trends for interventions.</a:t>
+              <a:t>Makes predictions about a population.</a:t>
             </a:r>
           </a:p>
         </p:txBody>
@@ -13505,7 +13505,7 @@
           <a:lstStyle/>
           <a:p>
             <a:r>
-              <a:t>AI devices collect patient data for proactive care.</a:t>
+              <a:t>Includes t-tests, chi-square tests, and regression analysis.</a:t>
             </a:r>
           </a:p>
         </p:txBody>
@@ -13526,7 +13526,7 @@
           <a:lstStyle/>
           <a:p>
             <a:r>
-              <a:t>AI enhances decision-making in patient management.</a:t>
+              <a:t>Aids in decision-making and hypothesis testing.</a:t>
             </a:r>
           </a:p>
         </p:txBody>
@@ -13547,7 +13547,7 @@
           <a:lstStyle/>
           <a:p>
             <a:r>
-              <a:t>AI in Patient Management</a:t>
+              <a:t>Methods for Analyzing Sample Data</a:t>
             </a:r>
           </a:p>
         </p:txBody>
@@ -13568,7 +13568,7 @@
           <a:lstStyle/>
           <a:p>
             <a:r>
-              <a:t>Revolutionizing patient care</a:t>
+              <a:t>Statistical techniques</a:t>
             </a:r>
           </a:p>
         </p:txBody>
@@ -13589,7 +13589,7 @@
           <a:lstStyle/>
           <a:p>
             <a:r>
-              <a:t>Chronic Disease Management</a:t>
+              <a:t>Inferential Statistics</a:t>
             </a:r>
           </a:p>
         </p:txBody>
@@ -13610,7 +13610,7 @@
           <a:lstStyle/>
           <a:p>
             <a:r>
-              <a:t>Remote Monitoring</a:t>
+              <a:t>Common Methods</a:t>
             </a:r>
           </a:p>
         </p:txBody>
@@ -13631,7 +13631,7 @@
           <a:lstStyle/>
           <a:p>
             <a:r>
-              <a:t>Data-Driven Insights</a:t>
+              <a:t>Data Analysis</a:t>
             </a:r>
           </a:p>
         </p:txBody>
@@ -13670,7 +13670,196 @@
           <a:lstStyle/>
           <a:p>
             <a:r>
-              <a:t>AI enhances diagnostic accuracy and early disease detection, optimizes personalized treatment plans, and improves patient management with advanced tools.</a:t>
+              <a:t>Sample Data</a:t>
+            </a:r>
+          </a:p>
+        </p:txBody>
+      </p:sp>
+      <p:sp>
+        <p:nvSpPr>
+          <p:cNvPr id="3" name="Text Placeholder 2"/>
+          <p:cNvSpPr>
+            <a:spLocks noGrp="1"/>
+          </p:cNvSpPr>
+          <p:nvPr>
+            <p:ph type="body" idx="18" sz="quarter"/>
+          </p:nvPr>
+        </p:nvSpPr>
+        <p:spPr/>
+        <p:txBody>
+          <a:bodyPr/>
+          <a:lstStyle/>
+          <a:p>
+            <a:r>
+              <a:t>A representative subset used for analysis.</a:t>
+            </a:r>
+          </a:p>
+        </p:txBody>
+      </p:sp>
+      <p:sp>
+        <p:nvSpPr>
+          <p:cNvPr id="4" name="Text Placeholder 3"/>
+          <p:cNvSpPr>
+            <a:spLocks noGrp="1"/>
+          </p:cNvSpPr>
+          <p:nvPr>
+            <p:ph type="body" idx="19" sz="quarter"/>
+          </p:nvPr>
+        </p:nvSpPr>
+        <p:spPr/>
+        <p:txBody>
+          <a:bodyPr/>
+          <a:lstStyle/>
+          <a:p>
+            <a:r>
+              <a:t>Essential for effective research.</a:t>
+            </a:r>
+          </a:p>
+        </p:txBody>
+      </p:sp>
+      <p:sp>
+        <p:nvSpPr>
+          <p:cNvPr id="5" name="Text Placeholder 4"/>
+          <p:cNvSpPr>
+            <a:spLocks noGrp="1"/>
+          </p:cNvSpPr>
+          <p:nvPr>
+            <p:ph type="body" idx="20" sz="quarter"/>
+          </p:nvPr>
+        </p:nvSpPr>
+        <p:spPr/>
+        <p:txBody>
+          <a:bodyPr/>
+          <a:lstStyle/>
+          <a:p>
+            <a:r>
+              <a:t>Various methods employed for analysis.</a:t>
+            </a:r>
+          </a:p>
+        </p:txBody>
+      </p:sp>
+      <p:sp>
+        <p:nvSpPr>
+          <p:cNvPr id="6" name="Text Placeholder 5"/>
+          <p:cNvSpPr>
+            <a:spLocks noGrp="1"/>
+          </p:cNvSpPr>
+          <p:nvPr>
+            <p:ph type="body" idx="21" sz="quarter"/>
+          </p:nvPr>
+        </p:nvSpPr>
+        <p:spPr/>
+        <p:txBody>
+          <a:bodyPr/>
+          <a:lstStyle/>
+          <a:p>
+            <a:r>
+              <a:t>Supports informed decisions in research.</a:t>
+            </a:r>
+          </a:p>
+        </p:txBody>
+      </p:sp>
+      <p:sp>
+        <p:nvSpPr>
+          <p:cNvPr id="7" name="Text Placeholder 6"/>
+          <p:cNvSpPr>
+            <a:spLocks noGrp="1"/>
+          </p:cNvSpPr>
+          <p:nvPr>
+            <p:ph type="body" idx="11" sz="quarter"/>
+          </p:nvPr>
+        </p:nvSpPr>
+        <p:spPr/>
+        <p:txBody>
+          <a:bodyPr/>
+          <a:lstStyle/>
+          <a:p>
+            <a:r>
+              <a:t>Summary</a:t>
+            </a:r>
+          </a:p>
+        </p:txBody>
+      </p:sp>
+      <p:sp>
+        <p:nvSpPr>
+          <p:cNvPr id="8" name="Text Placeholder 7"/>
+          <p:cNvSpPr>
+            <a:spLocks noGrp="1"/>
+          </p:cNvSpPr>
+          <p:nvPr>
+            <p:ph type="body" idx="12" sz="quarter"/>
+          </p:nvPr>
+        </p:nvSpPr>
+        <p:spPr/>
+        <p:txBody>
+          <a:bodyPr/>
+          <a:lstStyle/>
+          <a:p>
+            <a:r>
+              <a:t>Recap of key ideas</a:t>
+            </a:r>
+          </a:p>
+        </p:txBody>
+      </p:sp>
+      <p:sp>
+        <p:nvSpPr>
+          <p:cNvPr id="9" name="Text Placeholder 8"/>
+          <p:cNvSpPr>
+            <a:spLocks noGrp="1"/>
+          </p:cNvSpPr>
+          <p:nvPr>
+            <p:ph type="body" idx="22" sz="quarter"/>
+          </p:nvPr>
+        </p:nvSpPr>
+        <p:spPr/>
+        <p:txBody>
+          <a:bodyPr/>
+          <a:lstStyle/>
+          <a:p>
+            <a:r>
+              <a:t>Efficiency</a:t>
+            </a:r>
+          </a:p>
+        </p:txBody>
+      </p:sp>
+      <p:sp>
+        <p:nvSpPr>
+          <p:cNvPr id="10" name="Text Placeholder 9"/>
+          <p:cNvSpPr>
+            <a:spLocks noGrp="1"/>
+          </p:cNvSpPr>
+          <p:nvPr>
+            <p:ph type="body" idx="23" sz="quarter"/>
+          </p:nvPr>
+        </p:nvSpPr>
+        <p:spPr/>
+        <p:txBody>
+          <a:bodyPr/>
+          <a:lstStyle/>
+          <a:p>
+            <a:r>
+              <a:t>Statistical Methods</a:t>
+            </a:r>
+          </a:p>
+        </p:txBody>
+      </p:sp>
+      <p:sp>
+        <p:nvSpPr>
+          <p:cNvPr id="11" name="Text Placeholder 10"/>
+          <p:cNvSpPr>
+            <a:spLocks noGrp="1"/>
+          </p:cNvSpPr>
+          <p:nvPr>
+            <p:ph type="body" idx="24" sz="quarter"/>
+          </p:nvPr>
+        </p:nvSpPr>
+        <p:spPr/>
+        <p:txBody>
+          <a:bodyPr/>
+          <a:lstStyle/>
+          <a:p>
+            <a:r>
+              <a:t>Decision-making</a:t>
             </a:r>
           </a:p>
         </p:txBody>

</xml_diff>